<commit_message>
updated readme and ppt
</commit_message>
<xml_diff>
--- a/FinalProject/TranMini/TranBrian-Presentation.pptx
+++ b/FinalProject/TranMini/TranBrian-Presentation.pptx
@@ -13,6 +13,7 @@
     <p:sldId id="261" r:id="rId7"/>
     <p:sldId id="262" r:id="rId8"/>
     <p:sldId id="263" r:id="rId9"/>
+    <p:sldId id="264" r:id="rId10"/>
   </p:sldIdLst>
   <p:sldSz cx="9144000" cy="6858000" type="screen4x3"/>
   <p:notesSz cx="6858000" cy="9144000"/>
@@ -4189,7 +4190,21 @@
           <a:p>
             <a:r>
               <a:rPr lang="en-US" dirty="0" smtClean="0"/>
-              <a:t>Web Dev w/ .NET Final Project</a:t>
+              <a:t>Web Dev w/ .NET Final </a:t>
+            </a:r>
+            <a:r>
+              <a:rPr lang="en-US" dirty="0" smtClean="0"/>
+              <a:t>Project</a:t>
+            </a:r>
+          </a:p>
+          <a:p>
+            <a:r>
+              <a:rPr lang="en-US" dirty="0" smtClean="0"/>
+              <a:t>Professor </a:t>
+            </a:r>
+            <a:r>
+              <a:rPr lang="en-US" dirty="0" err="1" smtClean="0"/>
+              <a:t>Konstantopou</a:t>
             </a:r>
             <a:endParaRPr lang="en-US" dirty="0"/>
           </a:p>
@@ -5069,11 +5084,7 @@
             <a:pPr lvl="1"/>
             <a:r>
               <a:rPr lang="en-US" dirty="0" smtClean="0"/>
-              <a:t>Collision Detection</a:t>
-            </a:r>
-            <a:r>
-              <a:rPr lang="en-US" dirty="0" smtClean="0"/>
-              <a:t>?</a:t>
+              <a:t>Collision Detection?</a:t>
             </a:r>
           </a:p>
           <a:p>
@@ -5106,12 +5117,124 @@
           <a:p>
             <a:pPr lvl="2"/>
             <a:r>
-              <a:rPr lang="en-US" smtClean="0"/>
-              <a:t>Jumping Data</a:t>
+              <a:rPr lang="en-US" dirty="0" smtClean="0"/>
+              <a:t>“Jumping” </a:t>
+            </a:r>
+            <a:r>
+              <a:rPr lang="en-US" dirty="0" smtClean="0"/>
+              <a:t>Data</a:t>
             </a:r>
           </a:p>
           <a:p>
             <a:pPr lvl="2"/>
+            <a:endParaRPr lang="en-US" dirty="0" smtClean="0"/>
+          </a:p>
+        </p:txBody>
+      </p:sp>
+    </p:spTree>
+  </p:cSld>
+  <p:clrMapOvr>
+    <a:masterClrMapping/>
+  </p:clrMapOvr>
+</p:sld>
+</file>
+
+<file path=ppt/slides/slide9.xml><?xml version="1.0" encoding="utf-8"?>
+<p:sld xmlns:a="http://schemas.openxmlformats.org/drawingml/2006/main" xmlns:r="http://schemas.openxmlformats.org/officeDocument/2006/relationships" xmlns:p="http://schemas.openxmlformats.org/presentationml/2006/main">
+  <p:cSld>
+    <p:spTree>
+      <p:nvGrpSpPr>
+        <p:cNvPr id="1" name=""/>
+        <p:cNvGrpSpPr/>
+        <p:nvPr/>
+      </p:nvGrpSpPr>
+      <p:grpSpPr>
+        <a:xfrm>
+          <a:off x="0" y="0"/>
+          <a:ext cx="0" cy="0"/>
+          <a:chOff x="0" y="0"/>
+          <a:chExt cx="0" cy="0"/>
+        </a:xfrm>
+      </p:grpSpPr>
+      <p:sp>
+        <p:nvSpPr>
+          <p:cNvPr id="2" name="Title 1"/>
+          <p:cNvSpPr>
+            <a:spLocks noGrp="1"/>
+          </p:cNvSpPr>
+          <p:nvPr>
+            <p:ph type="title"/>
+          </p:nvPr>
+        </p:nvSpPr>
+        <p:spPr/>
+        <p:txBody>
+          <a:bodyPr/>
+          <a:lstStyle/>
+          <a:p>
+            <a:r>
+              <a:rPr lang="en-US" dirty="0" smtClean="0"/>
+              <a:t>References</a:t>
+            </a:r>
+            <a:endParaRPr lang="en-US" dirty="0"/>
+          </a:p>
+        </p:txBody>
+      </p:sp>
+      <p:sp>
+        <p:nvSpPr>
+          <p:cNvPr id="3" name="Content Placeholder 2"/>
+          <p:cNvSpPr>
+            <a:spLocks noGrp="1"/>
+          </p:cNvSpPr>
+          <p:nvPr>
+            <p:ph idx="1"/>
+          </p:nvPr>
+        </p:nvSpPr>
+        <p:spPr/>
+        <p:txBody>
+          <a:bodyPr/>
+          <a:lstStyle/>
+          <a:p>
+            <a:r>
+              <a:rPr lang="en-US" dirty="0" smtClean="0">
+                <a:hlinkClick r:id="rId2"/>
+              </a:rPr>
+              <a:t>https://www.asp.net/signalr</a:t>
+            </a:r>
+          </a:p>
+          <a:p>
+            <a:r>
+              <a:rPr lang="en-US" dirty="0" smtClean="0">
+                <a:hlinkClick r:id="rId2"/>
+              </a:rPr>
+              <a:t>https</a:t>
+            </a:r>
+            <a:r>
+              <a:rPr lang="en-US" dirty="0" smtClean="0">
+                <a:hlinkClick r:id="rId2"/>
+              </a:rPr>
+              <a:t>://</a:t>
+            </a:r>
+            <a:r>
+              <a:rPr lang="en-US" dirty="0" smtClean="0">
+                <a:hlinkClick r:id="rId2"/>
+              </a:rPr>
+              <a:t>github.com/NTaylorMullen/ShootR/tree/master/ShootR</a:t>
+            </a:r>
+            <a:endParaRPr lang="en-US" dirty="0" smtClean="0"/>
+          </a:p>
+          <a:p>
+            <a:r>
+              <a:rPr lang="en-US" dirty="0" smtClean="0">
+                <a:hlinkClick r:id="rId3"/>
+              </a:rPr>
+              <a:t>https://</a:t>
+            </a:r>
+            <a:r>
+              <a:rPr lang="en-US" dirty="0" smtClean="0">
+                <a:hlinkClick r:id="rId3"/>
+              </a:rPr>
+              <a:t>phaser.io/docs/2.6.2/index</a:t>
+            </a:r>
             <a:endParaRPr lang="en-US" dirty="0" smtClean="0"/>
           </a:p>
         </p:txBody>

</xml_diff>